<commit_message>
creating a test page
</commit_message>
<xml_diff>
--- a/imgs/4things.pptx
+++ b/imgs/4things.pptx
@@ -2,12 +2,12 @@
 <file path=ppt/presentation.xml><?xml version="1.0" encoding="utf-8"?>
 <p:presentation xmlns:a="http://schemas.openxmlformats.org/drawingml/2006/main" xmlns:r="http://schemas.openxmlformats.org/officeDocument/2006/relationships" xmlns:p="http://schemas.openxmlformats.org/presentationml/2006/main" saveSubsetFonts="1">
   <p:sldMasterIdLst>
-    <p:sldMasterId id="2147483720" r:id="rId1"/>
+    <p:sldMasterId id="2147483732" r:id="rId1"/>
   </p:sldMasterIdLst>
   <p:sldIdLst>
     <p:sldId id="256" r:id="rId2"/>
   </p:sldIdLst>
-  <p:sldSz cx="12526963" cy="3200400"/>
+  <p:sldSz cx="10698163" cy="3200400"/>
   <p:notesSz cx="6858000" cy="9144000"/>
   <p:defaultTextStyle>
     <a:defPPr>
@@ -141,8 +141,8 @@
         </p:nvSpPr>
         <p:spPr>
           <a:xfrm>
-            <a:off x="1565871" y="523770"/>
-            <a:ext cx="9395222" cy="1114213"/>
+            <a:off x="1337271" y="523770"/>
+            <a:ext cx="8023622" cy="1114213"/>
           </a:xfrm>
         </p:spPr>
         <p:txBody>
@@ -173,8 +173,8 @@
         </p:nvSpPr>
         <p:spPr>
           <a:xfrm>
-            <a:off x="1565871" y="1680951"/>
-            <a:ext cx="9395222" cy="772689"/>
+            <a:off x="1337271" y="1680951"/>
+            <a:ext cx="8023622" cy="772689"/>
           </a:xfrm>
         </p:spPr>
         <p:txBody>
@@ -294,7 +294,7 @@
     </p:spTree>
     <p:extLst>
       <p:ext uri="{BB962C8B-B14F-4D97-AF65-F5344CB8AC3E}">
-        <p14:creationId xmlns:p14="http://schemas.microsoft.com/office/powerpoint/2010/main" val="760176676"/>
+        <p14:creationId xmlns:p14="http://schemas.microsoft.com/office/powerpoint/2010/main" val="852599319"/>
       </p:ext>
     </p:extLst>
   </p:cSld>
@@ -464,7 +464,7 @@
     </p:spTree>
     <p:extLst>
       <p:ext uri="{BB962C8B-B14F-4D97-AF65-F5344CB8AC3E}">
-        <p14:creationId xmlns:p14="http://schemas.microsoft.com/office/powerpoint/2010/main" val="1053194335"/>
+        <p14:creationId xmlns:p14="http://schemas.microsoft.com/office/powerpoint/2010/main" val="2521615979"/>
       </p:ext>
     </p:extLst>
   </p:cSld>
@@ -503,8 +503,8 @@
         </p:nvSpPr>
         <p:spPr>
           <a:xfrm>
-            <a:off x="8964608" y="170392"/>
-            <a:ext cx="2701126" cy="2712191"/>
+            <a:off x="7655873" y="170392"/>
+            <a:ext cx="2306791" cy="2712191"/>
           </a:xfrm>
         </p:spPr>
         <p:txBody>
@@ -531,8 +531,8 @@
         </p:nvSpPr>
         <p:spPr>
           <a:xfrm>
-            <a:off x="861229" y="170392"/>
-            <a:ext cx="7946792" cy="2712191"/>
+            <a:off x="735499" y="170392"/>
+            <a:ext cx="6786647" cy="2712191"/>
           </a:xfrm>
         </p:spPr>
         <p:txBody>
@@ -644,7 +644,7 @@
     </p:spTree>
     <p:extLst>
       <p:ext uri="{BB962C8B-B14F-4D97-AF65-F5344CB8AC3E}">
-        <p14:creationId xmlns:p14="http://schemas.microsoft.com/office/powerpoint/2010/main" val="3993317596"/>
+        <p14:creationId xmlns:p14="http://schemas.microsoft.com/office/powerpoint/2010/main" val="1512195739"/>
       </p:ext>
     </p:extLst>
   </p:cSld>
@@ -814,7 +814,7 @@
     </p:spTree>
     <p:extLst>
       <p:ext uri="{BB962C8B-B14F-4D97-AF65-F5344CB8AC3E}">
-        <p14:creationId xmlns:p14="http://schemas.microsoft.com/office/powerpoint/2010/main" val="1441968546"/>
+        <p14:creationId xmlns:p14="http://schemas.microsoft.com/office/powerpoint/2010/main" val="987218172"/>
       </p:ext>
     </p:extLst>
   </p:cSld>
@@ -853,8 +853,8 @@
         </p:nvSpPr>
         <p:spPr>
           <a:xfrm>
-            <a:off x="854704" y="797878"/>
-            <a:ext cx="10804506" cy="1331277"/>
+            <a:off x="729927" y="797878"/>
+            <a:ext cx="9227166" cy="1331277"/>
           </a:xfrm>
         </p:spPr>
         <p:txBody>
@@ -885,8 +885,8 @@
         </p:nvSpPr>
         <p:spPr>
           <a:xfrm>
-            <a:off x="854704" y="2141750"/>
-            <a:ext cx="10804506" cy="700087"/>
+            <a:off x="729927" y="2141750"/>
+            <a:ext cx="9227166" cy="700087"/>
           </a:xfrm>
         </p:spPr>
         <p:txBody>
@@ -1060,7 +1060,7 @@
     </p:spTree>
     <p:extLst>
       <p:ext uri="{BB962C8B-B14F-4D97-AF65-F5344CB8AC3E}">
-        <p14:creationId xmlns:p14="http://schemas.microsoft.com/office/powerpoint/2010/main" val="4230050191"/>
+        <p14:creationId xmlns:p14="http://schemas.microsoft.com/office/powerpoint/2010/main" val="4150890233"/>
       </p:ext>
     </p:extLst>
   </p:cSld>
@@ -1122,8 +1122,8 @@
         </p:nvSpPr>
         <p:spPr>
           <a:xfrm>
-            <a:off x="861229" y="851959"/>
-            <a:ext cx="5323959" cy="2030624"/>
+            <a:off x="735499" y="851959"/>
+            <a:ext cx="4546719" cy="2030624"/>
           </a:xfrm>
         </p:spPr>
         <p:txBody>
@@ -1179,8 +1179,8 @@
         </p:nvSpPr>
         <p:spPr>
           <a:xfrm>
-            <a:off x="6341775" y="851959"/>
-            <a:ext cx="5323959" cy="2030624"/>
+            <a:off x="5415945" y="851959"/>
+            <a:ext cx="4546719" cy="2030624"/>
           </a:xfrm>
         </p:spPr>
         <p:txBody>
@@ -1292,7 +1292,7 @@
     </p:spTree>
     <p:extLst>
       <p:ext uri="{BB962C8B-B14F-4D97-AF65-F5344CB8AC3E}">
-        <p14:creationId xmlns:p14="http://schemas.microsoft.com/office/powerpoint/2010/main" val="4070582133"/>
+        <p14:creationId xmlns:p14="http://schemas.microsoft.com/office/powerpoint/2010/main" val="4208333647"/>
       </p:ext>
     </p:extLst>
   </p:cSld>
@@ -1331,8 +1331,8 @@
         </p:nvSpPr>
         <p:spPr>
           <a:xfrm>
-            <a:off x="862860" y="170392"/>
-            <a:ext cx="10804506" cy="618596"/>
+            <a:off x="736892" y="170392"/>
+            <a:ext cx="9227166" cy="618596"/>
           </a:xfrm>
         </p:spPr>
         <p:txBody>
@@ -1359,8 +1359,8 @@
         </p:nvSpPr>
         <p:spPr>
           <a:xfrm>
-            <a:off x="862861" y="784543"/>
-            <a:ext cx="5299492" cy="384492"/>
+            <a:off x="736893" y="784543"/>
+            <a:ext cx="4525824" cy="384492"/>
           </a:xfrm>
         </p:spPr>
         <p:txBody>
@@ -1424,8 +1424,8 @@
         </p:nvSpPr>
         <p:spPr>
           <a:xfrm>
-            <a:off x="862861" y="1169035"/>
-            <a:ext cx="5299492" cy="1719474"/>
+            <a:off x="736893" y="1169035"/>
+            <a:ext cx="4525824" cy="1719474"/>
           </a:xfrm>
         </p:spPr>
         <p:txBody>
@@ -1481,8 +1481,8 @@
         </p:nvSpPr>
         <p:spPr>
           <a:xfrm>
-            <a:off x="6341775" y="784543"/>
-            <a:ext cx="5325591" cy="384492"/>
+            <a:off x="5415945" y="784543"/>
+            <a:ext cx="4548113" cy="384492"/>
           </a:xfrm>
         </p:spPr>
         <p:txBody>
@@ -1546,8 +1546,8 @@
         </p:nvSpPr>
         <p:spPr>
           <a:xfrm>
-            <a:off x="6341775" y="1169035"/>
-            <a:ext cx="5325591" cy="1719474"/>
+            <a:off x="5415945" y="1169035"/>
+            <a:ext cx="4548113" cy="1719474"/>
           </a:xfrm>
         </p:spPr>
         <p:txBody>
@@ -1659,7 +1659,7 @@
     </p:spTree>
     <p:extLst>
       <p:ext uri="{BB962C8B-B14F-4D97-AF65-F5344CB8AC3E}">
-        <p14:creationId xmlns:p14="http://schemas.microsoft.com/office/powerpoint/2010/main" val="1391599983"/>
+        <p14:creationId xmlns:p14="http://schemas.microsoft.com/office/powerpoint/2010/main" val="405440018"/>
       </p:ext>
     </p:extLst>
   </p:cSld>
@@ -1777,7 +1777,7 @@
     </p:spTree>
     <p:extLst>
       <p:ext uri="{BB962C8B-B14F-4D97-AF65-F5344CB8AC3E}">
-        <p14:creationId xmlns:p14="http://schemas.microsoft.com/office/powerpoint/2010/main" val="4038532185"/>
+        <p14:creationId xmlns:p14="http://schemas.microsoft.com/office/powerpoint/2010/main" val="2567620856"/>
       </p:ext>
     </p:extLst>
   </p:cSld>
@@ -1872,7 +1872,7 @@
     </p:spTree>
     <p:extLst>
       <p:ext uri="{BB962C8B-B14F-4D97-AF65-F5344CB8AC3E}">
-        <p14:creationId xmlns:p14="http://schemas.microsoft.com/office/powerpoint/2010/main" val="3110611622"/>
+        <p14:creationId xmlns:p14="http://schemas.microsoft.com/office/powerpoint/2010/main" val="2926293631"/>
       </p:ext>
     </p:extLst>
   </p:cSld>
@@ -1911,8 +1911,8 @@
         </p:nvSpPr>
         <p:spPr>
           <a:xfrm>
-            <a:off x="862861" y="213360"/>
-            <a:ext cx="4040271" cy="746760"/>
+            <a:off x="736892" y="213360"/>
+            <a:ext cx="3450436" cy="746760"/>
           </a:xfrm>
         </p:spPr>
         <p:txBody>
@@ -1943,8 +1943,8 @@
         </p:nvSpPr>
         <p:spPr>
           <a:xfrm>
-            <a:off x="5325591" y="460799"/>
-            <a:ext cx="6341775" cy="2274358"/>
+            <a:off x="4548113" y="460799"/>
+            <a:ext cx="5415945" cy="2274358"/>
           </a:xfrm>
         </p:spPr>
         <p:txBody>
@@ -2028,8 +2028,8 @@
         </p:nvSpPr>
         <p:spPr>
           <a:xfrm>
-            <a:off x="862861" y="960120"/>
-            <a:ext cx="4040271" cy="1778741"/>
+            <a:off x="736892" y="960120"/>
+            <a:ext cx="3450436" cy="1778741"/>
           </a:xfrm>
         </p:spPr>
         <p:txBody>
@@ -2149,7 +2149,7 @@
     </p:spTree>
     <p:extLst>
       <p:ext uri="{BB962C8B-B14F-4D97-AF65-F5344CB8AC3E}">
-        <p14:creationId xmlns:p14="http://schemas.microsoft.com/office/powerpoint/2010/main" val="4178300957"/>
+        <p14:creationId xmlns:p14="http://schemas.microsoft.com/office/powerpoint/2010/main" val="2316288219"/>
       </p:ext>
     </p:extLst>
   </p:cSld>
@@ -2188,8 +2188,8 @@
         </p:nvSpPr>
         <p:spPr>
           <a:xfrm>
-            <a:off x="862861" y="213360"/>
-            <a:ext cx="4040271" cy="746760"/>
+            <a:off x="736892" y="213360"/>
+            <a:ext cx="3450436" cy="746760"/>
           </a:xfrm>
         </p:spPr>
         <p:txBody>
@@ -2220,8 +2220,8 @@
         </p:nvSpPr>
         <p:spPr>
           <a:xfrm>
-            <a:off x="5325591" y="460799"/>
-            <a:ext cx="6341775" cy="2274358"/>
+            <a:off x="4548113" y="460799"/>
+            <a:ext cx="5415945" cy="2274358"/>
           </a:xfrm>
         </p:spPr>
         <p:txBody>
@@ -2285,8 +2285,8 @@
         </p:nvSpPr>
         <p:spPr>
           <a:xfrm>
-            <a:off x="862861" y="960120"/>
-            <a:ext cx="4040271" cy="1778741"/>
+            <a:off x="736892" y="960120"/>
+            <a:ext cx="3450436" cy="1778741"/>
           </a:xfrm>
         </p:spPr>
         <p:txBody>
@@ -2406,7 +2406,7 @@
     </p:spTree>
     <p:extLst>
       <p:ext uri="{BB962C8B-B14F-4D97-AF65-F5344CB8AC3E}">
-        <p14:creationId xmlns:p14="http://schemas.microsoft.com/office/powerpoint/2010/main" val="3455867889"/>
+        <p14:creationId xmlns:p14="http://schemas.microsoft.com/office/powerpoint/2010/main" val="1457883353"/>
       </p:ext>
     </p:extLst>
   </p:cSld>
@@ -2450,8 +2450,8 @@
         </p:nvSpPr>
         <p:spPr>
           <a:xfrm>
-            <a:off x="861229" y="170392"/>
-            <a:ext cx="10804506" cy="618596"/>
+            <a:off x="735499" y="170392"/>
+            <a:ext cx="9227166" cy="618596"/>
           </a:xfrm>
           <a:prstGeom prst="rect">
             <a:avLst/>
@@ -2483,8 +2483,8 @@
         </p:nvSpPr>
         <p:spPr>
           <a:xfrm>
-            <a:off x="861229" y="851959"/>
-            <a:ext cx="10804506" cy="2030624"/>
+            <a:off x="735499" y="851959"/>
+            <a:ext cx="9227166" cy="2030624"/>
           </a:xfrm>
           <a:prstGeom prst="rect">
             <a:avLst/>
@@ -2545,8 +2545,8 @@
         </p:nvSpPr>
         <p:spPr>
           <a:xfrm>
-            <a:off x="861229" y="2966297"/>
-            <a:ext cx="2818567" cy="170392"/>
+            <a:off x="735499" y="2966297"/>
+            <a:ext cx="2407087" cy="170392"/>
           </a:xfrm>
           <a:prstGeom prst="rect">
             <a:avLst/>
@@ -2586,8 +2586,8 @@
         </p:nvSpPr>
         <p:spPr>
           <a:xfrm>
-            <a:off x="4149557" y="2966297"/>
-            <a:ext cx="4227850" cy="170392"/>
+            <a:off x="3543767" y="2966297"/>
+            <a:ext cx="3610630" cy="170392"/>
           </a:xfrm>
           <a:prstGeom prst="rect">
             <a:avLst/>
@@ -2623,8 +2623,8 @@
         </p:nvSpPr>
         <p:spPr>
           <a:xfrm>
-            <a:off x="8847167" y="2966297"/>
-            <a:ext cx="2818567" cy="170392"/>
+            <a:off x="7555577" y="2966297"/>
+            <a:ext cx="2407087" cy="170392"/>
           </a:xfrm>
           <a:prstGeom prst="rect">
             <a:avLst/>
@@ -2655,23 +2655,23 @@
     </p:spTree>
     <p:extLst>
       <p:ext uri="{BB962C8B-B14F-4D97-AF65-F5344CB8AC3E}">
-        <p14:creationId xmlns:p14="http://schemas.microsoft.com/office/powerpoint/2010/main" val="4020124068"/>
+        <p14:creationId xmlns:p14="http://schemas.microsoft.com/office/powerpoint/2010/main" val="796591216"/>
       </p:ext>
     </p:extLst>
   </p:cSld>
   <p:clrMap bg1="lt1" tx1="dk1" bg2="lt2" tx2="dk2" accent1="accent1" accent2="accent2" accent3="accent3" accent4="accent4" accent5="accent5" accent6="accent6" hlink="hlink" folHlink="folHlink"/>
   <p:sldLayoutIdLst>
-    <p:sldLayoutId id="2147483721" r:id="rId1"/>
-    <p:sldLayoutId id="2147483722" r:id="rId2"/>
-    <p:sldLayoutId id="2147483723" r:id="rId3"/>
-    <p:sldLayoutId id="2147483724" r:id="rId4"/>
-    <p:sldLayoutId id="2147483725" r:id="rId5"/>
-    <p:sldLayoutId id="2147483726" r:id="rId6"/>
-    <p:sldLayoutId id="2147483727" r:id="rId7"/>
-    <p:sldLayoutId id="2147483728" r:id="rId8"/>
-    <p:sldLayoutId id="2147483729" r:id="rId9"/>
-    <p:sldLayoutId id="2147483730" r:id="rId10"/>
-    <p:sldLayoutId id="2147483731" r:id="rId11"/>
+    <p:sldLayoutId id="2147483733" r:id="rId1"/>
+    <p:sldLayoutId id="2147483734" r:id="rId2"/>
+    <p:sldLayoutId id="2147483735" r:id="rId3"/>
+    <p:sldLayoutId id="2147483736" r:id="rId4"/>
+    <p:sldLayoutId id="2147483737" r:id="rId5"/>
+    <p:sldLayoutId id="2147483738" r:id="rId6"/>
+    <p:sldLayoutId id="2147483739" r:id="rId7"/>
+    <p:sldLayoutId id="2147483740" r:id="rId8"/>
+    <p:sldLayoutId id="2147483741" r:id="rId9"/>
+    <p:sldLayoutId id="2147483742" r:id="rId10"/>
+    <p:sldLayoutId id="2147483743" r:id="rId11"/>
   </p:sldLayoutIdLst>
   <p:txStyles>
     <p:titleStyle>
@@ -2975,10 +2975,10 @@
       </p:grpSpPr>
       <p:pic>
         <p:nvPicPr>
-          <p:cNvPr id="5" name="Picture 4" descr="A screenshot of a cell phone&#10;&#10;Description automatically generated">
+          <p:cNvPr id="3" name="Picture 2" descr="A screenshot of a cell phone&#10;&#10;Description automatically generated">
             <a:extLst>
               <a:ext uri="{FF2B5EF4-FFF2-40B4-BE49-F238E27FC236}">
-                <a16:creationId xmlns:a16="http://schemas.microsoft.com/office/drawing/2014/main" id="{3123A639-8982-4E6C-B164-9E5F55B02F4D}"/>
+                <a16:creationId xmlns:a16="http://schemas.microsoft.com/office/drawing/2014/main" id="{13512BD8-099A-4157-964D-A8DD38B5B3CB}"/>
               </a:ext>
             </a:extLst>
           </p:cNvPr>
@@ -3001,7 +3001,7 @@
         </p:blipFill>
         <p:spPr>
           <a:xfrm>
-            <a:off x="3456605" y="82296"/>
+            <a:off x="2524887" y="76708"/>
             <a:ext cx="5873908" cy="3046984"/>
           </a:xfrm>
           <a:prstGeom prst="rect">

</xml_diff>